<commit_message>
Finish complexity metrics demo
</commit_message>
<xml_diff>
--- a/Evaluer la qualite de code PowerShell avec PSCodeHealth.pptx
+++ b/Evaluer la qualite de code PowerShell avec PSCodeHealth.pptx
@@ -16,6 +16,7 @@
     <p:sldId id="264" r:id="rId10"/>
     <p:sldId id="265" r:id="rId11"/>
     <p:sldId id="266" r:id="rId12"/>
+    <p:sldId id="267" r:id="rId13"/>
   </p:sldIdLst>
   <p:sldSz cx="9144000" cy="6858000" type="screen4x3"/>
   <p:notesSz cx="6858000" cy="9144000"/>
@@ -8175,14 +8176,195 @@
         </p:nvSpPr>
         <p:spPr>
           <a:xfrm>
-            <a:off x="1295400" y="2286000"/>
-            <a:ext cx="6400800" cy="3474720"/>
+            <a:off x="1295400" y="2819400"/>
+            <a:ext cx="6400800" cy="3733800"/>
           </a:xfrm>
         </p:spPr>
         <p:txBody>
           <a:bodyPr/>
           <a:lstStyle/>
           <a:p>
+            <a:pPr>
+              <a:buFont typeface="Courier New" panose="02070309020205020404" pitchFamily="49" charset="0"/>
+              <a:buChar char="o"/>
+            </a:pPr>
+            <a:r>
+              <a:rPr lang="en-US" dirty="0" smtClean="0"/>
+              <a:t> </a:t>
+            </a:r>
+            <a:r>
+              <a:rPr lang="en-US" dirty="0" err="1" smtClean="0"/>
+              <a:t>Complexité</a:t>
+            </a:r>
+            <a:r>
+              <a:rPr lang="en-US" dirty="0" smtClean="0"/>
+              <a:t> :</a:t>
+            </a:r>
+          </a:p>
+          <a:p>
+            <a:pPr marL="45720" indent="0">
+              <a:buNone/>
+            </a:pPr>
+            <a:endParaRPr lang="en-US" dirty="0" smtClean="0"/>
+          </a:p>
+          <a:p>
+            <a:pPr lvl="1">
+              <a:buFont typeface="Courier New" panose="02070309020205020404" pitchFamily="49" charset="0"/>
+              <a:buChar char="o"/>
+            </a:pPr>
+            <a:r>
+              <a:rPr lang="en-US" dirty="0"/>
+              <a:t> </a:t>
+            </a:r>
+            <a:r>
+              <a:rPr lang="en-US" dirty="0" err="1" smtClean="0"/>
+              <a:t>Complexité</a:t>
+            </a:r>
+            <a:r>
+              <a:rPr lang="en-US" dirty="0" smtClean="0"/>
+              <a:t> </a:t>
+            </a:r>
+            <a:r>
+              <a:rPr lang="en-US" dirty="0" err="1" smtClean="0"/>
+              <a:t>cyclomatique</a:t>
+            </a:r>
+            <a:r>
+              <a:rPr lang="en-US" dirty="0" smtClean="0"/>
+              <a:t> :</a:t>
+            </a:r>
+          </a:p>
+          <a:p>
+            <a:pPr marL="640080" lvl="2" indent="0">
+              <a:buNone/>
+            </a:pPr>
+            <a:r>
+              <a:rPr lang="en-US" dirty="0" err="1" smtClean="0"/>
+              <a:t>Nombre</a:t>
+            </a:r>
+            <a:r>
+              <a:rPr lang="en-US" dirty="0" smtClean="0"/>
+              <a:t> de </a:t>
+            </a:r>
+            <a:r>
+              <a:rPr lang="en-US" dirty="0" err="1" smtClean="0"/>
+              <a:t>chemins</a:t>
+            </a:r>
+            <a:r>
+              <a:rPr lang="en-US" dirty="0" smtClean="0"/>
+              <a:t> </a:t>
+            </a:r>
+            <a:r>
+              <a:rPr lang="en-US" dirty="0" err="1" smtClean="0"/>
+              <a:t>possibles</a:t>
+            </a:r>
+            <a:r>
+              <a:rPr lang="en-US" dirty="0" smtClean="0"/>
+              <a:t> </a:t>
+            </a:r>
+            <a:r>
+              <a:rPr lang="en-US" dirty="0" err="1" smtClean="0"/>
+              <a:t>dans</a:t>
+            </a:r>
+            <a:r>
+              <a:rPr lang="en-US" dirty="0" smtClean="0"/>
+              <a:t> le code </a:t>
+            </a:r>
+            <a:r>
+              <a:rPr lang="en-US" dirty="0" err="1" smtClean="0"/>
+              <a:t>lors</a:t>
+            </a:r>
+            <a:r>
+              <a:rPr lang="en-US" dirty="0" smtClean="0"/>
+              <a:t> de </a:t>
+            </a:r>
+            <a:r>
+              <a:rPr lang="en-US" dirty="0" err="1" smtClean="0"/>
+              <a:t>l’éxecution</a:t>
+            </a:r>
+            <a:r>
+              <a:rPr lang="en-US" dirty="0" smtClean="0"/>
+              <a:t> </a:t>
+            </a:r>
+            <a:r>
+              <a:rPr lang="en-US" dirty="0" err="1" smtClean="0"/>
+              <a:t>d’une</a:t>
+            </a:r>
+            <a:r>
+              <a:rPr lang="en-US" dirty="0" smtClean="0"/>
+              <a:t> </a:t>
+            </a:r>
+            <a:r>
+              <a:rPr lang="en-US" dirty="0" err="1" smtClean="0"/>
+              <a:t>fonction</a:t>
+            </a:r>
+            <a:endParaRPr lang="en-US" dirty="0" smtClean="0"/>
+          </a:p>
+          <a:p>
+            <a:pPr lvl="1">
+              <a:buFont typeface="Courier New" panose="02070309020205020404" pitchFamily="49" charset="0"/>
+              <a:buChar char="o"/>
+            </a:pPr>
+            <a:r>
+              <a:rPr lang="en-US" dirty="0"/>
+              <a:t> </a:t>
+            </a:r>
+            <a:r>
+              <a:rPr lang="en-US" dirty="0" err="1" smtClean="0"/>
+              <a:t>Niveau</a:t>
+            </a:r>
+            <a:r>
+              <a:rPr lang="en-US" dirty="0" smtClean="0"/>
+              <a:t> </a:t>
+            </a:r>
+            <a:r>
+              <a:rPr lang="en-US" dirty="0" err="1" smtClean="0"/>
+              <a:t>d’imbrication</a:t>
+            </a:r>
+            <a:r>
+              <a:rPr lang="en-US" dirty="0" smtClean="0"/>
+              <a:t> maximal :</a:t>
+            </a:r>
+          </a:p>
+          <a:p>
+            <a:pPr marL="640080" lvl="2" indent="0">
+              <a:buNone/>
+            </a:pPr>
+            <a:r>
+              <a:rPr lang="en-US" dirty="0" err="1" smtClean="0"/>
+              <a:t>Nombre</a:t>
+            </a:r>
+            <a:r>
+              <a:rPr lang="en-US" dirty="0" smtClean="0"/>
+              <a:t> de blocs </a:t>
+            </a:r>
+            <a:r>
+              <a:rPr lang="en-US" dirty="0" err="1" smtClean="0"/>
+              <a:t>imbriqués</a:t>
+            </a:r>
+            <a:r>
+              <a:rPr lang="en-US" dirty="0" smtClean="0"/>
+              <a:t> entre le corps de la </a:t>
+            </a:r>
+            <a:r>
+              <a:rPr lang="en-US" dirty="0" err="1" smtClean="0"/>
+              <a:t>fonction</a:t>
+            </a:r>
+            <a:r>
+              <a:rPr lang="en-US" dirty="0" smtClean="0"/>
+              <a:t> et la portion de code la plus </a:t>
+            </a:r>
+            <a:r>
+              <a:rPr lang="en-US" dirty="0" err="1" smtClean="0"/>
+              <a:t>profondément</a:t>
+            </a:r>
+            <a:r>
+              <a:rPr lang="en-US" dirty="0" smtClean="0"/>
+              <a:t> </a:t>
+            </a:r>
+            <a:r>
+              <a:rPr lang="en-US" dirty="0" err="1" smtClean="0"/>
+              <a:t>imbriquée</a:t>
+            </a:r>
             <a:endParaRPr lang="en-US" dirty="0"/>
           </a:p>
         </p:txBody>
@@ -8190,7 +8372,80 @@
     </p:spTree>
     <p:extLst>
       <p:ext uri="{BB962C8B-B14F-4D97-AF65-F5344CB8AC3E}">
-        <p14:creationId xmlns:p14="http://schemas.microsoft.com/office/powerpoint/2010/main" val="4186084560"/>
+        <p14:creationId xmlns:p14="http://schemas.microsoft.com/office/powerpoint/2010/main" val="3209316376"/>
+      </p:ext>
+    </p:extLst>
+  </p:cSld>
+  <p:clrMapOvr>
+    <a:masterClrMapping/>
+  </p:clrMapOvr>
+</p:sld>
+</file>
+
+<file path=ppt/slides/slide12.xml><?xml version="1.0" encoding="utf-8"?>
+<p:sld xmlns:a="http://schemas.openxmlformats.org/drawingml/2006/main" xmlns:r="http://schemas.openxmlformats.org/officeDocument/2006/relationships" xmlns:p="http://schemas.openxmlformats.org/presentationml/2006/main">
+  <p:cSld>
+    <p:spTree>
+      <p:nvGrpSpPr>
+        <p:cNvPr id="1" name=""/>
+        <p:cNvGrpSpPr/>
+        <p:nvPr/>
+      </p:nvGrpSpPr>
+      <p:grpSpPr>
+        <a:xfrm>
+          <a:off x="0" y="0"/>
+          <a:ext cx="0" cy="0"/>
+          <a:chOff x="0" y="0"/>
+          <a:chExt cx="0" cy="0"/>
+        </a:xfrm>
+      </p:grpSpPr>
+      <p:sp>
+        <p:nvSpPr>
+          <p:cNvPr id="2" name="Title 1"/>
+          <p:cNvSpPr>
+            <a:spLocks noGrp="1"/>
+          </p:cNvSpPr>
+          <p:nvPr>
+            <p:ph type="title"/>
+          </p:nvPr>
+        </p:nvSpPr>
+        <p:spPr>
+          <a:xfrm>
+            <a:off x="1905000" y="381000"/>
+            <a:ext cx="6512511" cy="1143000"/>
+          </a:xfrm>
+        </p:spPr>
+        <p:txBody>
+          <a:bodyPr/>
+          <a:lstStyle/>
+          <a:p>
+            <a:pPr marL="0" indent="0" algn="ctr">
+              <a:buNone/>
+            </a:pPr>
+            <a:r>
+              <a:rPr lang="en-US" dirty="0" smtClean="0"/>
+              <a:t>Demo : </a:t>
+            </a:r>
+            <a:r>
+              <a:rPr lang="en-US" dirty="0" err="1" smtClean="0"/>
+              <a:t>Métriques</a:t>
+            </a:r>
+            <a:r>
+              <a:rPr lang="en-US" dirty="0" smtClean="0"/>
+              <a:t> de </a:t>
+            </a:r>
+            <a:r>
+              <a:rPr lang="en-US" dirty="0" err="1" smtClean="0"/>
+              <a:t>complexité</a:t>
+            </a:r>
+            <a:endParaRPr lang="en-US" dirty="0"/>
+          </a:p>
+        </p:txBody>
+      </p:sp>
+    </p:spTree>
+    <p:extLst>
+      <p:ext uri="{BB962C8B-B14F-4D97-AF65-F5344CB8AC3E}">
+        <p14:creationId xmlns:p14="http://schemas.microsoft.com/office/powerpoint/2010/main" val="1784918600"/>
       </p:ext>
     </p:extLst>
   </p:cSld>
@@ -9009,13 +9264,8 @@
             </a:r>
             <a:r>
               <a:rPr lang="en-US" dirty="0" smtClean="0"/>
-              <a:t>descriptive </a:t>
-            </a:r>
-            <a:r>
-              <a:rPr lang="en-US" dirty="0" smtClean="0"/>
-              <a:t>:</a:t>
-            </a:r>
-            <a:endParaRPr lang="en-US" dirty="0" smtClean="0"/>
+              <a:t>descriptive :</a:t>
+            </a:r>
           </a:p>
           <a:p>
             <a:pPr lvl="1">
@@ -10060,7 +10310,6 @@
               <a:rPr lang="en-US" dirty="0" smtClean="0"/>
               <a:t>Interchanger</a:t>
             </a:r>
-            <a:endParaRPr lang="en-US" dirty="0" smtClean="0"/>
           </a:p>
           <a:p>
             <a:pPr>
@@ -10260,7 +10509,6 @@
               <a:rPr lang="en-US" dirty="0" smtClean="0"/>
               <a:t>)</a:t>
             </a:r>
-            <a:endParaRPr lang="en-US" dirty="0" smtClean="0"/>
           </a:p>
           <a:p>
             <a:pPr lvl="1">

</xml_diff>